<commit_message>
Added some more images to presentation
</commit_message>
<xml_diff>
--- a/Writing/FYP-Presentation.pptx
+++ b/Writing/FYP-Presentation.pptx
@@ -4,6 +4,9 @@
   <p:sldMasterIdLst>
     <p:sldMasterId id="2147483648" r:id="rId1"/>
   </p:sldMasterIdLst>
+  <p:notesMasterIdLst>
+    <p:notesMasterId r:id="rId16"/>
+  </p:notesMasterIdLst>
   <p:sldIdLst>
     <p:sldId id="256" r:id="rId2"/>
     <p:sldId id="257" r:id="rId3"/>
@@ -17,7 +20,7 @@
     <p:sldId id="265" r:id="rId11"/>
     <p:sldId id="268" r:id="rId12"/>
     <p:sldId id="266" r:id="rId13"/>
-    <p:sldId id="267" r:id="rId14"/>
+    <p:sldId id="270" r:id="rId14"/>
     <p:sldId id="269" r:id="rId15"/>
   </p:sldIdLst>
   <p:sldSz cx="12192000" cy="6858000"/>
@@ -123,6 +126,439 @@
     </p:ext>
   </p:extLst>
 </p:presentation>
+</file>
+
+<file path=ppt/notesMasters/notesMaster1.xml><?xml version="1.0" encoding="utf-8"?>
+<p:notesMaster xmlns:a="http://schemas.openxmlformats.org/drawingml/2006/main" xmlns:r="http://schemas.openxmlformats.org/officeDocument/2006/relationships" xmlns:p="http://schemas.openxmlformats.org/presentationml/2006/main">
+  <p:cSld>
+    <p:bg>
+      <p:bgRef idx="1001">
+        <a:schemeClr val="bg1"/>
+      </p:bgRef>
+    </p:bg>
+    <p:spTree>
+      <p:nvGrpSpPr>
+        <p:cNvPr id="1" name=""/>
+        <p:cNvGrpSpPr/>
+        <p:nvPr/>
+      </p:nvGrpSpPr>
+      <p:grpSpPr>
+        <a:xfrm>
+          <a:off x="0" y="0"/>
+          <a:ext cx="0" cy="0"/>
+          <a:chOff x="0" y="0"/>
+          <a:chExt cx="0" cy="0"/>
+        </a:xfrm>
+      </p:grpSpPr>
+      <p:sp>
+        <p:nvSpPr>
+          <p:cNvPr id="2" name="Header Placeholder 1"/>
+          <p:cNvSpPr>
+            <a:spLocks noGrp="1"/>
+          </p:cNvSpPr>
+          <p:nvPr>
+            <p:ph type="hdr" sz="quarter"/>
+          </p:nvPr>
+        </p:nvSpPr>
+        <p:spPr>
+          <a:xfrm>
+            <a:off x="0" y="0"/>
+            <a:ext cx="2971800" cy="458788"/>
+          </a:xfrm>
+          <a:prstGeom prst="rect">
+            <a:avLst/>
+          </a:prstGeom>
+        </p:spPr>
+        <p:txBody>
+          <a:bodyPr vert="horz" lIns="91440" tIns="45720" rIns="91440" bIns="45720" rtlCol="0"/>
+          <a:lstStyle>
+            <a:lvl1pPr algn="l">
+              <a:defRPr sz="1200"/>
+            </a:lvl1pPr>
+          </a:lstStyle>
+          <a:p>
+            <a:endParaRPr lang="en-GB"/>
+          </a:p>
+        </p:txBody>
+      </p:sp>
+      <p:sp>
+        <p:nvSpPr>
+          <p:cNvPr id="3" name="Date Placeholder 2"/>
+          <p:cNvSpPr>
+            <a:spLocks noGrp="1"/>
+          </p:cNvSpPr>
+          <p:nvPr>
+            <p:ph type="dt" idx="1"/>
+          </p:nvPr>
+        </p:nvSpPr>
+        <p:spPr>
+          <a:xfrm>
+            <a:off x="3884613" y="0"/>
+            <a:ext cx="2971800" cy="458788"/>
+          </a:xfrm>
+          <a:prstGeom prst="rect">
+            <a:avLst/>
+          </a:prstGeom>
+        </p:spPr>
+        <p:txBody>
+          <a:bodyPr vert="horz" lIns="91440" tIns="45720" rIns="91440" bIns="45720" rtlCol="0"/>
+          <a:lstStyle>
+            <a:lvl1pPr algn="r">
+              <a:defRPr sz="1200"/>
+            </a:lvl1pPr>
+          </a:lstStyle>
+          <a:p>
+            <a:fld id="{F913F210-0CF3-4EE9-B9EE-928130558A11}" type="datetimeFigureOut">
+              <a:rPr lang="en-GB" smtClean="0"/>
+              <a:t>05/05/2025</a:t>
+            </a:fld>
+            <a:endParaRPr lang="en-GB"/>
+          </a:p>
+        </p:txBody>
+      </p:sp>
+      <p:sp>
+        <p:nvSpPr>
+          <p:cNvPr id="4" name="Slide Image Placeholder 3"/>
+          <p:cNvSpPr>
+            <a:spLocks noGrp="1" noRot="1" noChangeAspect="1"/>
+          </p:cNvSpPr>
+          <p:nvPr>
+            <p:ph type="sldImg" idx="2"/>
+          </p:nvPr>
+        </p:nvSpPr>
+        <p:spPr>
+          <a:xfrm>
+            <a:off x="685800" y="1143000"/>
+            <a:ext cx="5486400" cy="3086100"/>
+          </a:xfrm>
+          <a:prstGeom prst="rect">
+            <a:avLst/>
+          </a:prstGeom>
+          <a:noFill/>
+          <a:ln w="12700">
+            <a:solidFill>
+              <a:prstClr val="black"/>
+            </a:solidFill>
+          </a:ln>
+        </p:spPr>
+        <p:txBody>
+          <a:bodyPr vert="horz" lIns="91440" tIns="45720" rIns="91440" bIns="45720" rtlCol="0" anchor="ctr"/>
+          <a:lstStyle/>
+          <a:p>
+            <a:endParaRPr lang="en-GB"/>
+          </a:p>
+        </p:txBody>
+      </p:sp>
+      <p:sp>
+        <p:nvSpPr>
+          <p:cNvPr id="5" name="Notes Placeholder 4"/>
+          <p:cNvSpPr>
+            <a:spLocks noGrp="1"/>
+          </p:cNvSpPr>
+          <p:nvPr>
+            <p:ph type="body" sz="quarter" idx="3"/>
+          </p:nvPr>
+        </p:nvSpPr>
+        <p:spPr>
+          <a:xfrm>
+            <a:off x="685800" y="4400550"/>
+            <a:ext cx="5486400" cy="3600450"/>
+          </a:xfrm>
+          <a:prstGeom prst="rect">
+            <a:avLst/>
+          </a:prstGeom>
+        </p:spPr>
+        <p:txBody>
+          <a:bodyPr vert="horz" lIns="91440" tIns="45720" rIns="91440" bIns="45720" rtlCol="0"/>
+          <a:lstStyle/>
+          <a:p>
+            <a:pPr lvl="0"/>
+            <a:r>
+              <a:rPr lang="en-GB"/>
+              <a:t>Click to edit Master text styles</a:t>
+            </a:r>
+          </a:p>
+          <a:p>
+            <a:pPr lvl="1"/>
+            <a:r>
+              <a:rPr lang="en-GB"/>
+              <a:t>Second level</a:t>
+            </a:r>
+          </a:p>
+          <a:p>
+            <a:pPr lvl="2"/>
+            <a:r>
+              <a:rPr lang="en-GB"/>
+              <a:t>Third level</a:t>
+            </a:r>
+          </a:p>
+          <a:p>
+            <a:pPr lvl="3"/>
+            <a:r>
+              <a:rPr lang="en-GB"/>
+              <a:t>Fourth level</a:t>
+            </a:r>
+          </a:p>
+          <a:p>
+            <a:pPr lvl="4"/>
+            <a:r>
+              <a:rPr lang="en-GB"/>
+              <a:t>Fifth level</a:t>
+            </a:r>
+          </a:p>
+        </p:txBody>
+      </p:sp>
+      <p:sp>
+        <p:nvSpPr>
+          <p:cNvPr id="6" name="Footer Placeholder 5"/>
+          <p:cNvSpPr>
+            <a:spLocks noGrp="1"/>
+          </p:cNvSpPr>
+          <p:nvPr>
+            <p:ph type="ftr" sz="quarter" idx="4"/>
+          </p:nvPr>
+        </p:nvSpPr>
+        <p:spPr>
+          <a:xfrm>
+            <a:off x="0" y="8685213"/>
+            <a:ext cx="2971800" cy="458787"/>
+          </a:xfrm>
+          <a:prstGeom prst="rect">
+            <a:avLst/>
+          </a:prstGeom>
+        </p:spPr>
+        <p:txBody>
+          <a:bodyPr vert="horz" lIns="91440" tIns="45720" rIns="91440" bIns="45720" rtlCol="0" anchor="b"/>
+          <a:lstStyle>
+            <a:lvl1pPr algn="l">
+              <a:defRPr sz="1200"/>
+            </a:lvl1pPr>
+          </a:lstStyle>
+          <a:p>
+            <a:endParaRPr lang="en-GB"/>
+          </a:p>
+        </p:txBody>
+      </p:sp>
+      <p:sp>
+        <p:nvSpPr>
+          <p:cNvPr id="7" name="Slide Number Placeholder 6"/>
+          <p:cNvSpPr>
+            <a:spLocks noGrp="1"/>
+          </p:cNvSpPr>
+          <p:nvPr>
+            <p:ph type="sldNum" sz="quarter" idx="5"/>
+          </p:nvPr>
+        </p:nvSpPr>
+        <p:spPr>
+          <a:xfrm>
+            <a:off x="3884613" y="8685213"/>
+            <a:ext cx="2971800" cy="458787"/>
+          </a:xfrm>
+          <a:prstGeom prst="rect">
+            <a:avLst/>
+          </a:prstGeom>
+        </p:spPr>
+        <p:txBody>
+          <a:bodyPr vert="horz" lIns="91440" tIns="45720" rIns="91440" bIns="45720" rtlCol="0" anchor="b"/>
+          <a:lstStyle>
+            <a:lvl1pPr algn="r">
+              <a:defRPr sz="1200"/>
+            </a:lvl1pPr>
+          </a:lstStyle>
+          <a:p>
+            <a:fld id="{D354EA80-B79B-4DEC-8908-024BF43B449A}" type="slidenum">
+              <a:rPr lang="en-GB" smtClean="0"/>
+              <a:t>‹#›</a:t>
+            </a:fld>
+            <a:endParaRPr lang="en-GB"/>
+          </a:p>
+        </p:txBody>
+      </p:sp>
+    </p:spTree>
+    <p:extLst>
+      <p:ext uri="{BB962C8B-B14F-4D97-AF65-F5344CB8AC3E}">
+        <p14:creationId xmlns:p14="http://schemas.microsoft.com/office/powerpoint/2010/main" val="4060330103"/>
+      </p:ext>
+    </p:extLst>
+  </p:cSld>
+  <p:clrMap bg1="lt1" tx1="dk1" bg2="lt2" tx2="dk2" accent1="accent1" accent2="accent2" accent3="accent3" accent4="accent4" accent5="accent5" accent6="accent6" hlink="hlink" folHlink="folHlink"/>
+  <p:notesStyle>
+    <a:lvl1pPr marL="0" algn="l" defTabSz="914400" rtl="0" eaLnBrk="1" latinLnBrk="0" hangingPunct="1">
+      <a:defRPr sz="1200" kern="1200">
+        <a:solidFill>
+          <a:schemeClr val="tx1"/>
+        </a:solidFill>
+        <a:latin typeface="+mn-lt"/>
+        <a:ea typeface="+mn-ea"/>
+        <a:cs typeface="+mn-cs"/>
+      </a:defRPr>
+    </a:lvl1pPr>
+    <a:lvl2pPr marL="457200" algn="l" defTabSz="914400" rtl="0" eaLnBrk="1" latinLnBrk="0" hangingPunct="1">
+      <a:defRPr sz="1200" kern="1200">
+        <a:solidFill>
+          <a:schemeClr val="tx1"/>
+        </a:solidFill>
+        <a:latin typeface="+mn-lt"/>
+        <a:ea typeface="+mn-ea"/>
+        <a:cs typeface="+mn-cs"/>
+      </a:defRPr>
+    </a:lvl2pPr>
+    <a:lvl3pPr marL="914400" algn="l" defTabSz="914400" rtl="0" eaLnBrk="1" latinLnBrk="0" hangingPunct="1">
+      <a:defRPr sz="1200" kern="1200">
+        <a:solidFill>
+          <a:schemeClr val="tx1"/>
+        </a:solidFill>
+        <a:latin typeface="+mn-lt"/>
+        <a:ea typeface="+mn-ea"/>
+        <a:cs typeface="+mn-cs"/>
+      </a:defRPr>
+    </a:lvl3pPr>
+    <a:lvl4pPr marL="1371600" algn="l" defTabSz="914400" rtl="0" eaLnBrk="1" latinLnBrk="0" hangingPunct="1">
+      <a:defRPr sz="1200" kern="1200">
+        <a:solidFill>
+          <a:schemeClr val="tx1"/>
+        </a:solidFill>
+        <a:latin typeface="+mn-lt"/>
+        <a:ea typeface="+mn-ea"/>
+        <a:cs typeface="+mn-cs"/>
+      </a:defRPr>
+    </a:lvl4pPr>
+    <a:lvl5pPr marL="1828800" algn="l" defTabSz="914400" rtl="0" eaLnBrk="1" latinLnBrk="0" hangingPunct="1">
+      <a:defRPr sz="1200" kern="1200">
+        <a:solidFill>
+          <a:schemeClr val="tx1"/>
+        </a:solidFill>
+        <a:latin typeface="+mn-lt"/>
+        <a:ea typeface="+mn-ea"/>
+        <a:cs typeface="+mn-cs"/>
+      </a:defRPr>
+    </a:lvl5pPr>
+    <a:lvl6pPr marL="2286000" algn="l" defTabSz="914400" rtl="0" eaLnBrk="1" latinLnBrk="0" hangingPunct="1">
+      <a:defRPr sz="1200" kern="1200">
+        <a:solidFill>
+          <a:schemeClr val="tx1"/>
+        </a:solidFill>
+        <a:latin typeface="+mn-lt"/>
+        <a:ea typeface="+mn-ea"/>
+        <a:cs typeface="+mn-cs"/>
+      </a:defRPr>
+    </a:lvl6pPr>
+    <a:lvl7pPr marL="2743200" algn="l" defTabSz="914400" rtl="0" eaLnBrk="1" latinLnBrk="0" hangingPunct="1">
+      <a:defRPr sz="1200" kern="1200">
+        <a:solidFill>
+          <a:schemeClr val="tx1"/>
+        </a:solidFill>
+        <a:latin typeface="+mn-lt"/>
+        <a:ea typeface="+mn-ea"/>
+        <a:cs typeface="+mn-cs"/>
+      </a:defRPr>
+    </a:lvl7pPr>
+    <a:lvl8pPr marL="3200400" algn="l" defTabSz="914400" rtl="0" eaLnBrk="1" latinLnBrk="0" hangingPunct="1">
+      <a:defRPr sz="1200" kern="1200">
+        <a:solidFill>
+          <a:schemeClr val="tx1"/>
+        </a:solidFill>
+        <a:latin typeface="+mn-lt"/>
+        <a:ea typeface="+mn-ea"/>
+        <a:cs typeface="+mn-cs"/>
+      </a:defRPr>
+    </a:lvl8pPr>
+    <a:lvl9pPr marL="3657600" algn="l" defTabSz="914400" rtl="0" eaLnBrk="1" latinLnBrk="0" hangingPunct="1">
+      <a:defRPr sz="1200" kern="1200">
+        <a:solidFill>
+          <a:schemeClr val="tx1"/>
+        </a:solidFill>
+        <a:latin typeface="+mn-lt"/>
+        <a:ea typeface="+mn-ea"/>
+        <a:cs typeface="+mn-cs"/>
+      </a:defRPr>
+    </a:lvl9pPr>
+  </p:notesStyle>
+</p:notesMaster>
+</file>
+
+<file path=ppt/notesSlides/notesSlide1.xml><?xml version="1.0" encoding="utf-8"?>
+<p:notes xmlns:a="http://schemas.openxmlformats.org/drawingml/2006/main" xmlns:r="http://schemas.openxmlformats.org/officeDocument/2006/relationships" xmlns:p="http://schemas.openxmlformats.org/presentationml/2006/main">
+  <p:cSld>
+    <p:spTree>
+      <p:nvGrpSpPr>
+        <p:cNvPr id="1" name=""/>
+        <p:cNvGrpSpPr/>
+        <p:nvPr/>
+      </p:nvGrpSpPr>
+      <p:grpSpPr>
+        <a:xfrm>
+          <a:off x="0" y="0"/>
+          <a:ext cx="0" cy="0"/>
+          <a:chOff x="0" y="0"/>
+          <a:chExt cx="0" cy="0"/>
+        </a:xfrm>
+      </p:grpSpPr>
+      <p:sp>
+        <p:nvSpPr>
+          <p:cNvPr id="2" name="Slide Image Placeholder 1"/>
+          <p:cNvSpPr>
+            <a:spLocks noGrp="1" noRot="1" noChangeAspect="1"/>
+          </p:cNvSpPr>
+          <p:nvPr>
+            <p:ph type="sldImg"/>
+          </p:nvPr>
+        </p:nvSpPr>
+        <p:spPr/>
+      </p:sp>
+      <p:sp>
+        <p:nvSpPr>
+          <p:cNvPr id="3" name="Notes Placeholder 2"/>
+          <p:cNvSpPr>
+            <a:spLocks noGrp="1"/>
+          </p:cNvSpPr>
+          <p:nvPr>
+            <p:ph type="body" idx="1"/>
+          </p:nvPr>
+        </p:nvSpPr>
+        <p:spPr/>
+        <p:txBody>
+          <a:bodyPr/>
+          <a:lstStyle/>
+          <a:p>
+            <a:endParaRPr lang="en-GB" dirty="0"/>
+          </a:p>
+        </p:txBody>
+      </p:sp>
+      <p:sp>
+        <p:nvSpPr>
+          <p:cNvPr id="4" name="Slide Number Placeholder 3"/>
+          <p:cNvSpPr>
+            <a:spLocks noGrp="1"/>
+          </p:cNvSpPr>
+          <p:nvPr>
+            <p:ph type="sldNum" sz="quarter" idx="5"/>
+          </p:nvPr>
+        </p:nvSpPr>
+        <p:spPr/>
+        <p:txBody>
+          <a:bodyPr/>
+          <a:lstStyle/>
+          <a:p>
+            <a:fld id="{D354EA80-B79B-4DEC-8908-024BF43B449A}" type="slidenum">
+              <a:rPr lang="en-GB" smtClean="0"/>
+              <a:t>11</a:t>
+            </a:fld>
+            <a:endParaRPr lang="en-GB"/>
+          </a:p>
+        </p:txBody>
+      </p:sp>
+    </p:spTree>
+    <p:extLst>
+      <p:ext uri="{BB962C8B-B14F-4D97-AF65-F5344CB8AC3E}">
+        <p14:creationId xmlns:p14="http://schemas.microsoft.com/office/powerpoint/2010/main" val="2545291585"/>
+      </p:ext>
+    </p:extLst>
+  </p:cSld>
+  <p:clrMapOvr>
+    <a:masterClrMapping/>
+  </p:clrMapOvr>
+</p:notes>
 </file>
 
 <file path=ppt/slideLayouts/slideLayout1.xml><?xml version="1.0" encoding="utf-8"?>
@@ -3700,7 +4136,12 @@
             <p:ph type="title"/>
           </p:nvPr>
         </p:nvSpPr>
-        <p:spPr/>
+        <p:spPr>
+          <a:xfrm>
+            <a:off x="7736114" y="365125"/>
+            <a:ext cx="3617685" cy="1325563"/>
+          </a:xfrm>
+        </p:spPr>
         <p:txBody>
           <a:bodyPr/>
           <a:lstStyle/>
@@ -3730,13 +4171,13 @@
         </p:nvSpPr>
         <p:spPr>
           <a:xfrm>
-            <a:off x="7736115" y="1840139"/>
-            <a:ext cx="4314372" cy="4351338"/>
+            <a:off x="7736114" y="1840139"/>
+            <a:ext cx="4314372" cy="4652736"/>
           </a:xfrm>
         </p:spPr>
         <p:txBody>
           <a:bodyPr>
-            <a:normAutofit fontScale="70000" lnSpcReduction="20000"/>
+            <a:normAutofit fontScale="77500" lnSpcReduction="20000"/>
           </a:bodyPr>
           <a:lstStyle/>
           <a:p>
@@ -3794,7 +4235,7 @@
           </p:cNvPicPr>
           <p:nvPr/>
         </p:nvPicPr>
-        <p:blipFill>
+        <p:blipFill rotWithShape="1">
           <a:blip r:embed="rId2">
             <a:extLst>
               <a:ext uri="{28A0092B-C50C-407E-A947-70E740481C1C}">
@@ -3802,15 +4243,13 @@
               </a:ext>
             </a:extLst>
           </a:blip>
-          <a:srcRect/>
-          <a:stretch>
-            <a:fillRect/>
-          </a:stretch>
+          <a:srcRect l="20208" r="14167"/>
+          <a:stretch/>
         </p:blipFill>
         <p:spPr bwMode="auto">
           <a:xfrm>
-            <a:off x="522514" y="1690688"/>
-            <a:ext cx="6966856" cy="3890735"/>
+            <a:off x="-595086" y="0"/>
+            <a:ext cx="8058833" cy="6858000"/>
           </a:xfrm>
           <a:prstGeom prst="rect">
             <a:avLst/>
@@ -3908,7 +4347,12 @@
             <p:ph type="title"/>
           </p:nvPr>
         </p:nvSpPr>
-        <p:spPr/>
+        <p:spPr>
+          <a:xfrm>
+            <a:off x="8110916" y="336097"/>
+            <a:ext cx="3921427" cy="1325563"/>
+          </a:xfrm>
+        </p:spPr>
         <p:txBody>
           <a:bodyPr/>
           <a:lstStyle/>
@@ -3938,7 +4382,7 @@
         </p:nvSpPr>
         <p:spPr>
           <a:xfrm>
-            <a:off x="838200" y="1825625"/>
+            <a:off x="8110916" y="2020207"/>
             <a:ext cx="3545114" cy="4351338"/>
           </a:xfrm>
         </p:spPr>
@@ -3987,23 +4431,21 @@
           </p:cNvPicPr>
           <p:nvPr/>
         </p:nvPicPr>
-        <p:blipFill>
-          <a:blip r:embed="rId2">
+        <p:blipFill rotWithShape="1">
+          <a:blip r:embed="rId3">
             <a:extLst>
               <a:ext uri="{28A0092B-C50C-407E-A947-70E740481C1C}">
                 <a14:useLocalDpi xmlns:a14="http://schemas.microsoft.com/office/drawing/2010/main" val="0"/>
               </a:ext>
             </a:extLst>
           </a:blip>
-          <a:srcRect/>
-          <a:stretch>
-            <a:fillRect/>
-          </a:stretch>
+          <a:srcRect l="14362" r="22830"/>
+          <a:stretch/>
         </p:blipFill>
         <p:spPr bwMode="auto">
           <a:xfrm>
-            <a:off x="4668383" y="1741942"/>
-            <a:ext cx="7247845" cy="4036332"/>
+            <a:off x="0" y="0"/>
+            <a:ext cx="7734604" cy="6858000"/>
           </a:xfrm>
           <a:prstGeom prst="rect">
             <a:avLst/>
@@ -4020,42 +4462,6 @@
           </a:extLst>
         </p:spPr>
       </p:pic>
-      <p:sp>
-        <p:nvSpPr>
-          <p:cNvPr id="6" name="TextBox 5">
-            <a:extLst>
-              <a:ext uri="{FF2B5EF4-FFF2-40B4-BE49-F238E27FC236}">
-                <a16:creationId xmlns:a16="http://schemas.microsoft.com/office/drawing/2014/main" id="{0505859E-3676-13A3-512C-811FE82DFD4F}"/>
-              </a:ext>
-            </a:extLst>
-          </p:cNvPr>
-          <p:cNvSpPr txBox="1"/>
-          <p:nvPr/>
-        </p:nvSpPr>
-        <p:spPr>
-          <a:xfrm>
-            <a:off x="7808688" y="5778274"/>
-            <a:ext cx="3976914" cy="307777"/>
-          </a:xfrm>
-          <a:prstGeom prst="rect">
-            <a:avLst/>
-          </a:prstGeom>
-          <a:noFill/>
-        </p:spPr>
-        <p:txBody>
-          <a:bodyPr wrap="square" rtlCol="0">
-            <a:spAutoFit/>
-          </a:bodyPr>
-          <a:lstStyle/>
-          <a:p>
-            <a:pPr algn="r"/>
-            <a:r>
-              <a:rPr lang="en-GB" sz="1400" i="1" dirty="0"/>
-              <a:t>  A Settlement and Planet</a:t>
-            </a:r>
-          </a:p>
-        </p:txBody>
-      </p:sp>
     </p:spTree>
     <p:extLst>
       <p:ext uri="{BB962C8B-B14F-4D97-AF65-F5344CB8AC3E}">
@@ -4102,7 +4508,12 @@
             <p:ph type="title"/>
           </p:nvPr>
         </p:nvSpPr>
-        <p:spPr/>
+        <p:spPr>
+          <a:xfrm>
+            <a:off x="344714" y="365125"/>
+            <a:ext cx="4343400" cy="1325563"/>
+          </a:xfrm>
+        </p:spPr>
         <p:txBody>
           <a:bodyPr/>
           <a:lstStyle/>
@@ -4132,7 +4543,7 @@
         </p:nvSpPr>
         <p:spPr>
           <a:xfrm>
-            <a:off x="838200" y="1825625"/>
+            <a:off x="344714" y="1825625"/>
             <a:ext cx="4343400" cy="4351338"/>
           </a:xfrm>
         </p:spPr>
@@ -4193,7 +4604,7 @@
           </p:cNvPicPr>
           <p:nvPr/>
         </p:nvPicPr>
-        <p:blipFill>
+        <p:blipFill rotWithShape="1">
           <a:blip r:embed="rId2">
             <a:extLst>
               <a:ext uri="{28A0092B-C50C-407E-A947-70E740481C1C}">
@@ -4201,15 +4612,13 @@
               </a:ext>
             </a:extLst>
           </a:blip>
-          <a:srcRect/>
-          <a:stretch>
-            <a:fillRect/>
-          </a:stretch>
+          <a:srcRect l="15299" r="18348"/>
+          <a:stretch/>
         </p:blipFill>
         <p:spPr bwMode="auto">
           <a:xfrm>
-            <a:off x="5326741" y="1984953"/>
-            <a:ext cx="6545943" cy="3671865"/>
+            <a:off x="4894317" y="0"/>
+            <a:ext cx="8112237" cy="6858000"/>
           </a:xfrm>
           <a:prstGeom prst="rect">
             <a:avLst/>
@@ -4226,42 +4635,6 @@
           </a:extLst>
         </p:spPr>
       </p:pic>
-      <p:sp>
-        <p:nvSpPr>
-          <p:cNvPr id="4" name="TextBox 3">
-            <a:extLst>
-              <a:ext uri="{FF2B5EF4-FFF2-40B4-BE49-F238E27FC236}">
-                <a16:creationId xmlns:a16="http://schemas.microsoft.com/office/drawing/2014/main" id="{F37EB437-41E3-6449-AE43-39058BD19C3B}"/>
-              </a:ext>
-            </a:extLst>
-          </p:cNvPr>
-          <p:cNvSpPr txBox="1"/>
-          <p:nvPr/>
-        </p:nvSpPr>
-        <p:spPr>
-          <a:xfrm>
-            <a:off x="7895770" y="5656818"/>
-            <a:ext cx="3976914" cy="523220"/>
-          </a:xfrm>
-          <a:prstGeom prst="rect">
-            <a:avLst/>
-          </a:prstGeom>
-          <a:noFill/>
-        </p:spPr>
-        <p:txBody>
-          <a:bodyPr wrap="square" rtlCol="0">
-            <a:spAutoFit/>
-          </a:bodyPr>
-          <a:lstStyle/>
-          <a:p>
-            <a:pPr algn="r"/>
-            <a:r>
-              <a:rPr lang="en-GB" sz="1400" i="1" dirty="0"/>
-              <a:t>An early battle stress test, Settlements battles can reach similar numbers  of ships</a:t>
-            </a:r>
-          </a:p>
-        </p:txBody>
-      </p:sp>
     </p:spTree>
     <p:extLst>
       <p:ext uri="{BB962C8B-B14F-4D97-AF65-F5344CB8AC3E}">
@@ -4280,7 +4653,13 @@
   <p:cSld>
     <p:spTree>
       <p:nvGrpSpPr>
-        <p:cNvPr id="1" name=""/>
+        <p:cNvPr id="1" name="">
+          <a:extLst>
+            <a:ext uri="{FF2B5EF4-FFF2-40B4-BE49-F238E27FC236}">
+              <a16:creationId xmlns:a16="http://schemas.microsoft.com/office/drawing/2014/main" id="{D2B1318D-F12F-8484-6FEA-E69F0583F825}"/>
+            </a:ext>
+          </a:extLst>
+        </p:cNvPr>
         <p:cNvGrpSpPr/>
         <p:nvPr/>
       </p:nvGrpSpPr>
@@ -4297,7 +4676,7 @@
           <p:cNvPr id="2" name="Title 1">
             <a:extLst>
               <a:ext uri="{FF2B5EF4-FFF2-40B4-BE49-F238E27FC236}">
-                <a16:creationId xmlns:a16="http://schemas.microsoft.com/office/drawing/2014/main" id="{E064B4A2-D362-9499-1664-AC5C99896672}"/>
+                <a16:creationId xmlns:a16="http://schemas.microsoft.com/office/drawing/2014/main" id="{CCB5461C-829A-32E4-CC6D-65BA0FA38F29}"/>
               </a:ext>
             </a:extLst>
           </p:cNvPr>
@@ -4308,7 +4687,12 @@
             <p:ph type="title"/>
           </p:nvPr>
         </p:nvSpPr>
-        <p:spPr/>
+        <p:spPr>
+          <a:xfrm>
+            <a:off x="344714" y="365125"/>
+            <a:ext cx="4343400" cy="1325563"/>
+          </a:xfrm>
+        </p:spPr>
         <p:txBody>
           <a:bodyPr/>
           <a:lstStyle/>
@@ -4325,7 +4709,7 @@
           <p:cNvPr id="3" name="Content Placeholder 2">
             <a:extLst>
               <a:ext uri="{FF2B5EF4-FFF2-40B4-BE49-F238E27FC236}">
-                <a16:creationId xmlns:a16="http://schemas.microsoft.com/office/drawing/2014/main" id="{79ED83EE-26FF-D194-54AC-64CB5935E560}"/>
+                <a16:creationId xmlns:a16="http://schemas.microsoft.com/office/drawing/2014/main" id="{A25BBDE7-4E46-65CC-499C-CFFC3039E049}"/>
               </a:ext>
             </a:extLst>
           </p:cNvPr>
@@ -4338,13 +4722,13 @@
         </p:nvSpPr>
         <p:spPr>
           <a:xfrm>
-            <a:off x="8113486" y="1606120"/>
-            <a:ext cx="3918857" cy="4351338"/>
+            <a:off x="344714" y="1825625"/>
+            <a:ext cx="4343400" cy="4351338"/>
           </a:xfrm>
         </p:spPr>
         <p:txBody>
           <a:bodyPr>
-            <a:normAutofit fontScale="70000" lnSpcReduction="20000"/>
+            <a:normAutofit fontScale="77500" lnSpcReduction="20000"/>
           </a:bodyPr>
           <a:lstStyle/>
           <a:p>
@@ -4386,14 +4770,26 @@
               <a:t>Travel itself could be a major point of improvement for the game in my opinion. It is such an important aspect of the game but holds little gameplay value.</a:t>
             </a:r>
           </a:p>
+          <a:p>
+            <a:pPr marL="0" indent="0">
+              <a:buNone/>
+            </a:pPr>
+            <a:endParaRPr lang="en-GB" dirty="0"/>
+          </a:p>
+          <a:p>
+            <a:pPr marL="0" indent="0">
+              <a:buNone/>
+            </a:pPr>
+            <a:endParaRPr lang="en-GB" dirty="0"/>
+          </a:p>
         </p:txBody>
       </p:sp>
       <p:pic>
         <p:nvPicPr>
-          <p:cNvPr id="5126" name="Picture 6">
-            <a:extLst>
-              <a:ext uri="{FF2B5EF4-FFF2-40B4-BE49-F238E27FC236}">
-                <a16:creationId xmlns:a16="http://schemas.microsoft.com/office/drawing/2014/main" id="{AB2AE47D-8604-D03D-F12D-C9338C565AD7}"/>
+          <p:cNvPr id="4098" name="Picture 2">
+            <a:extLst>
+              <a:ext uri="{FF2B5EF4-FFF2-40B4-BE49-F238E27FC236}">
+                <a16:creationId xmlns:a16="http://schemas.microsoft.com/office/drawing/2014/main" id="{0B0DCBE4-F3FC-162D-4212-BDD44BC39051}"/>
               </a:ext>
             </a:extLst>
           </p:cNvPr>
@@ -4402,7 +4798,7 @@
           </p:cNvPicPr>
           <p:nvPr/>
         </p:nvPicPr>
-        <p:blipFill>
+        <p:blipFill rotWithShape="1">
           <a:blip r:embed="rId2">
             <a:extLst>
               <a:ext uri="{28A0092B-C50C-407E-A947-70E740481C1C}">
@@ -4410,15 +4806,13 @@
               </a:ext>
             </a:extLst>
           </a:blip>
-          <a:srcRect/>
-          <a:stretch>
-            <a:fillRect/>
-          </a:stretch>
+          <a:srcRect l="15299" r="18348"/>
+          <a:stretch/>
         </p:blipFill>
         <p:spPr bwMode="auto">
           <a:xfrm>
-            <a:off x="453570" y="1690688"/>
-            <a:ext cx="7456715" cy="4149740"/>
+            <a:off x="4894317" y="0"/>
+            <a:ext cx="8112237" cy="6858000"/>
           </a:xfrm>
           <a:prstGeom prst="rect">
             <a:avLst/>
@@ -4435,45 +4829,55 @@
           </a:extLst>
         </p:spPr>
       </p:pic>
-      <p:sp>
-        <p:nvSpPr>
-          <p:cNvPr id="5" name="TextBox 4">
-            <a:extLst>
-              <a:ext uri="{FF2B5EF4-FFF2-40B4-BE49-F238E27FC236}">
-                <a16:creationId xmlns:a16="http://schemas.microsoft.com/office/drawing/2014/main" id="{5301F302-E177-6A79-686F-76EB2083D860}"/>
-              </a:ext>
-            </a:extLst>
-          </p:cNvPr>
-          <p:cNvSpPr txBox="1"/>
+      <p:pic>
+        <p:nvPicPr>
+          <p:cNvPr id="4" name="Picture 6">
+            <a:extLst>
+              <a:ext uri="{FF2B5EF4-FFF2-40B4-BE49-F238E27FC236}">
+                <a16:creationId xmlns:a16="http://schemas.microsoft.com/office/drawing/2014/main" id="{72181513-2D7E-BA94-3C89-710E60916FD9}"/>
+              </a:ext>
+            </a:extLst>
+          </p:cNvPr>
+          <p:cNvPicPr>
+            <a:picLocks noChangeAspect="1" noChangeArrowheads="1"/>
+          </p:cNvPicPr>
           <p:nvPr/>
-        </p:nvSpPr>
-        <p:spPr>
+        </p:nvPicPr>
+        <p:blipFill rotWithShape="1">
+          <a:blip r:embed="rId3">
+            <a:extLst>
+              <a:ext uri="{28A0092B-C50C-407E-A947-70E740481C1C}">
+                <a14:useLocalDpi xmlns:a14="http://schemas.microsoft.com/office/drawing/2010/main" val="0"/>
+              </a:ext>
+            </a:extLst>
+          </a:blip>
+          <a:srcRect l="14160" r="12263"/>
+          <a:stretch/>
+        </p:blipFill>
+        <p:spPr bwMode="auto">
           <a:xfrm>
-            <a:off x="453570" y="5840428"/>
-            <a:ext cx="3976914" cy="307777"/>
+            <a:off x="4894317" y="-1"/>
+            <a:ext cx="9067008" cy="6857999"/>
           </a:xfrm>
           <a:prstGeom prst="rect">
             <a:avLst/>
           </a:prstGeom>
           <a:noFill/>
+          <a:extLst>
+            <a:ext uri="{909E8E84-426E-40DD-AFC4-6F175D3DCCD1}">
+              <a14:hiddenFill xmlns:a14="http://schemas.microsoft.com/office/drawing/2010/main">
+                <a:solidFill>
+                  <a:srgbClr val="FFFFFF"/>
+                </a:solidFill>
+              </a14:hiddenFill>
+            </a:ext>
+          </a:extLst>
         </p:spPr>
-        <p:txBody>
-          <a:bodyPr wrap="square" rtlCol="0">
-            <a:spAutoFit/>
-          </a:bodyPr>
-          <a:lstStyle/>
-          <a:p>
-            <a:r>
-              <a:rPr lang="en-GB" sz="1400" i="1" dirty="0"/>
-              <a:t>The player ship in fast travel.</a:t>
-            </a:r>
-          </a:p>
-        </p:txBody>
-      </p:sp>
+      </p:pic>
     </p:spTree>
     <p:extLst>
       <p:ext uri="{BB962C8B-B14F-4D97-AF65-F5344CB8AC3E}">
-        <p14:creationId xmlns:p14="http://schemas.microsoft.com/office/powerpoint/2010/main" val="228834265"/>
+        <p14:creationId xmlns:p14="http://schemas.microsoft.com/office/powerpoint/2010/main" val="914477918"/>
       </p:ext>
     </p:extLst>
   </p:cSld>
@@ -5887,4 +6291,319 @@
     </a:ext>
   </a:extLst>
 </a:theme>
+</file>
+
+<file path=ppt/theme/theme2.xml><?xml version="1.0" encoding="utf-8"?>
+<a:theme xmlns:a="http://schemas.openxmlformats.org/drawingml/2006/main" name="Office Theme">
+  <a:themeElements>
+    <a:clrScheme name="Office">
+      <a:dk1>
+        <a:sysClr val="windowText" lastClr="000000"/>
+      </a:dk1>
+      <a:lt1>
+        <a:sysClr val="window" lastClr="FFFFFF"/>
+      </a:lt1>
+      <a:dk2>
+        <a:srgbClr val="0E2841"/>
+      </a:dk2>
+      <a:lt2>
+        <a:srgbClr val="E8E8E8"/>
+      </a:lt2>
+      <a:accent1>
+        <a:srgbClr val="156082"/>
+      </a:accent1>
+      <a:accent2>
+        <a:srgbClr val="E97132"/>
+      </a:accent2>
+      <a:accent3>
+        <a:srgbClr val="196B24"/>
+      </a:accent3>
+      <a:accent4>
+        <a:srgbClr val="0F9ED5"/>
+      </a:accent4>
+      <a:accent5>
+        <a:srgbClr val="A02B93"/>
+      </a:accent5>
+      <a:accent6>
+        <a:srgbClr val="4EA72E"/>
+      </a:accent6>
+      <a:hlink>
+        <a:srgbClr val="467886"/>
+      </a:hlink>
+      <a:folHlink>
+        <a:srgbClr val="96607D"/>
+      </a:folHlink>
+    </a:clrScheme>
+    <a:fontScheme name="Office">
+      <a:majorFont>
+        <a:latin typeface="Aptos Display" panose="02110004020202020204"/>
+        <a:ea typeface=""/>
+        <a:cs typeface=""/>
+        <a:font script="Jpan" typeface="游ゴシック Light"/>
+        <a:font script="Hang" typeface="맑은 고딕"/>
+        <a:font script="Hans" typeface="等线 Light"/>
+        <a:font script="Hant" typeface="新細明體"/>
+        <a:font script="Arab" typeface="Times New Roman"/>
+        <a:font script="Hebr" typeface="Times New Roman"/>
+        <a:font script="Thai" typeface="Angsana New"/>
+        <a:font script="Ethi" typeface="Nyala"/>
+        <a:font script="Beng" typeface="Vrinda"/>
+        <a:font script="Gujr" typeface="Shruti"/>
+        <a:font script="Khmr" typeface="MoolBoran"/>
+        <a:font script="Knda" typeface="Tunga"/>
+        <a:font script="Guru" typeface="Raavi"/>
+        <a:font script="Cans" typeface="Euphemia"/>
+        <a:font script="Cher" typeface="Plantagenet Cherokee"/>
+        <a:font script="Yiii" typeface="Microsoft Yi Baiti"/>
+        <a:font script="Tibt" typeface="Microsoft Himalaya"/>
+        <a:font script="Thaa" typeface="MV Boli"/>
+        <a:font script="Deva" typeface="Mangal"/>
+        <a:font script="Telu" typeface="Gautami"/>
+        <a:font script="Taml" typeface="Latha"/>
+        <a:font script="Syrc" typeface="Estrangelo Edessa"/>
+        <a:font script="Orya" typeface="Kalinga"/>
+        <a:font script="Mlym" typeface="Kartika"/>
+        <a:font script="Laoo" typeface="DokChampa"/>
+        <a:font script="Sinh" typeface="Iskoola Pota"/>
+        <a:font script="Mong" typeface="Mongolian Baiti"/>
+        <a:font script="Viet" typeface="Times New Roman"/>
+        <a:font script="Uigh" typeface="Microsoft Uighur"/>
+        <a:font script="Geor" typeface="Sylfaen"/>
+        <a:font script="Armn" typeface="Arial"/>
+        <a:font script="Bugi" typeface="Leelawadee UI"/>
+        <a:font script="Bopo" typeface="Microsoft JhengHei"/>
+        <a:font script="Java" typeface="Javanese Text"/>
+        <a:font script="Lisu" typeface="Segoe UI"/>
+        <a:font script="Mymr" typeface="Myanmar Text"/>
+        <a:font script="Nkoo" typeface="Ebrima"/>
+        <a:font script="Olck" typeface="Nirmala UI"/>
+        <a:font script="Osma" typeface="Ebrima"/>
+        <a:font script="Phag" typeface="Phagspa"/>
+        <a:font script="Syrn" typeface="Estrangelo Edessa"/>
+        <a:font script="Syrj" typeface="Estrangelo Edessa"/>
+        <a:font script="Syre" typeface="Estrangelo Edessa"/>
+        <a:font script="Sora" typeface="Nirmala UI"/>
+        <a:font script="Tale" typeface="Microsoft Tai Le"/>
+        <a:font script="Talu" typeface="Microsoft New Tai Lue"/>
+        <a:font script="Tfng" typeface="Ebrima"/>
+      </a:majorFont>
+      <a:minorFont>
+        <a:latin typeface="Aptos" panose="02110004020202020204"/>
+        <a:ea typeface=""/>
+        <a:cs typeface=""/>
+        <a:font script="Jpan" typeface="游ゴシック"/>
+        <a:font script="Hang" typeface="맑은 고딕"/>
+        <a:font script="Hans" typeface="等线"/>
+        <a:font script="Hant" typeface="新細明體"/>
+        <a:font script="Arab" typeface="Arial"/>
+        <a:font script="Hebr" typeface="Arial"/>
+        <a:font script="Thai" typeface="Cordia New"/>
+        <a:font script="Ethi" typeface="Nyala"/>
+        <a:font script="Beng" typeface="Vrinda"/>
+        <a:font script="Gujr" typeface="Shruti"/>
+        <a:font script="Khmr" typeface="DaunPenh"/>
+        <a:font script="Knda" typeface="Tunga"/>
+        <a:font script="Guru" typeface="Raavi"/>
+        <a:font script="Cans" typeface="Euphemia"/>
+        <a:font script="Cher" typeface="Plantagenet Cherokee"/>
+        <a:font script="Yiii" typeface="Microsoft Yi Baiti"/>
+        <a:font script="Tibt" typeface="Microsoft Himalaya"/>
+        <a:font script="Thaa" typeface="MV Boli"/>
+        <a:font script="Deva" typeface="Mangal"/>
+        <a:font script="Telu" typeface="Gautami"/>
+        <a:font script="Taml" typeface="Latha"/>
+        <a:font script="Syrc" typeface="Estrangelo Edessa"/>
+        <a:font script="Orya" typeface="Kalinga"/>
+        <a:font script="Mlym" typeface="Kartika"/>
+        <a:font script="Laoo" typeface="DokChampa"/>
+        <a:font script="Sinh" typeface="Iskoola Pota"/>
+        <a:font script="Mong" typeface="Mongolian Baiti"/>
+        <a:font script="Viet" typeface="Arial"/>
+        <a:font script="Uigh" typeface="Microsoft Uighur"/>
+        <a:font script="Geor" typeface="Sylfaen"/>
+        <a:font script="Armn" typeface="Arial"/>
+        <a:font script="Bugi" typeface="Leelawadee UI"/>
+        <a:font script="Bopo" typeface="Microsoft JhengHei"/>
+        <a:font script="Java" typeface="Javanese Text"/>
+        <a:font script="Lisu" typeface="Segoe UI"/>
+        <a:font script="Mymr" typeface="Myanmar Text"/>
+        <a:font script="Nkoo" typeface="Ebrima"/>
+        <a:font script="Olck" typeface="Nirmala UI"/>
+        <a:font script="Osma" typeface="Ebrima"/>
+        <a:font script="Phag" typeface="Phagspa"/>
+        <a:font script="Syrn" typeface="Estrangelo Edessa"/>
+        <a:font script="Syrj" typeface="Estrangelo Edessa"/>
+        <a:font script="Syre" typeface="Estrangelo Edessa"/>
+        <a:font script="Sora" typeface="Nirmala UI"/>
+        <a:font script="Tale" typeface="Microsoft Tai Le"/>
+        <a:font script="Talu" typeface="Microsoft New Tai Lue"/>
+        <a:font script="Tfng" typeface="Ebrima"/>
+      </a:minorFont>
+    </a:fontScheme>
+    <a:fmtScheme name="Office">
+      <a:fillStyleLst>
+        <a:solidFill>
+          <a:schemeClr val="phClr"/>
+        </a:solidFill>
+        <a:gradFill rotWithShape="1">
+          <a:gsLst>
+            <a:gs pos="0">
+              <a:schemeClr val="phClr">
+                <a:lumMod val="110000"/>
+                <a:satMod val="105000"/>
+                <a:tint val="67000"/>
+              </a:schemeClr>
+            </a:gs>
+            <a:gs pos="50000">
+              <a:schemeClr val="phClr">
+                <a:lumMod val="105000"/>
+                <a:satMod val="103000"/>
+                <a:tint val="73000"/>
+              </a:schemeClr>
+            </a:gs>
+            <a:gs pos="100000">
+              <a:schemeClr val="phClr">
+                <a:lumMod val="105000"/>
+                <a:satMod val="109000"/>
+                <a:tint val="81000"/>
+              </a:schemeClr>
+            </a:gs>
+          </a:gsLst>
+          <a:lin ang="5400000" scaled="0"/>
+        </a:gradFill>
+        <a:gradFill rotWithShape="1">
+          <a:gsLst>
+            <a:gs pos="0">
+              <a:schemeClr val="phClr">
+                <a:satMod val="103000"/>
+                <a:lumMod val="102000"/>
+                <a:tint val="94000"/>
+              </a:schemeClr>
+            </a:gs>
+            <a:gs pos="50000">
+              <a:schemeClr val="phClr">
+                <a:satMod val="110000"/>
+                <a:lumMod val="100000"/>
+                <a:shade val="100000"/>
+              </a:schemeClr>
+            </a:gs>
+            <a:gs pos="100000">
+              <a:schemeClr val="phClr">
+                <a:lumMod val="99000"/>
+                <a:satMod val="120000"/>
+                <a:shade val="78000"/>
+              </a:schemeClr>
+            </a:gs>
+          </a:gsLst>
+          <a:lin ang="5400000" scaled="0"/>
+        </a:gradFill>
+      </a:fillStyleLst>
+      <a:lnStyleLst>
+        <a:ln w="12700" cap="flat" cmpd="sng" algn="ctr">
+          <a:solidFill>
+            <a:schemeClr val="phClr"/>
+          </a:solidFill>
+          <a:prstDash val="solid"/>
+          <a:miter lim="800000"/>
+        </a:ln>
+        <a:ln w="19050" cap="flat" cmpd="sng" algn="ctr">
+          <a:solidFill>
+            <a:schemeClr val="phClr"/>
+          </a:solidFill>
+          <a:prstDash val="solid"/>
+          <a:miter lim="800000"/>
+        </a:ln>
+        <a:ln w="25400" cap="flat" cmpd="sng" algn="ctr">
+          <a:solidFill>
+            <a:schemeClr val="phClr"/>
+          </a:solidFill>
+          <a:prstDash val="solid"/>
+          <a:miter lim="800000"/>
+        </a:ln>
+      </a:lnStyleLst>
+      <a:effectStyleLst>
+        <a:effectStyle>
+          <a:effectLst/>
+        </a:effectStyle>
+        <a:effectStyle>
+          <a:effectLst/>
+        </a:effectStyle>
+        <a:effectStyle>
+          <a:effectLst>
+            <a:outerShdw blurRad="57150" dist="19050" dir="5400000" algn="ctr" rotWithShape="0">
+              <a:srgbClr val="000000">
+                <a:alpha val="63000"/>
+              </a:srgbClr>
+            </a:outerShdw>
+          </a:effectLst>
+        </a:effectStyle>
+      </a:effectStyleLst>
+      <a:bgFillStyleLst>
+        <a:solidFill>
+          <a:schemeClr val="phClr"/>
+        </a:solidFill>
+        <a:solidFill>
+          <a:schemeClr val="phClr">
+            <a:tint val="95000"/>
+            <a:satMod val="170000"/>
+          </a:schemeClr>
+        </a:solidFill>
+        <a:gradFill rotWithShape="1">
+          <a:gsLst>
+            <a:gs pos="0">
+              <a:schemeClr val="phClr">
+                <a:tint val="93000"/>
+                <a:satMod val="150000"/>
+                <a:shade val="98000"/>
+                <a:lumMod val="102000"/>
+              </a:schemeClr>
+            </a:gs>
+            <a:gs pos="50000">
+              <a:schemeClr val="phClr">
+                <a:tint val="98000"/>
+                <a:satMod val="130000"/>
+                <a:shade val="90000"/>
+                <a:lumMod val="103000"/>
+              </a:schemeClr>
+            </a:gs>
+            <a:gs pos="100000">
+              <a:schemeClr val="phClr">
+                <a:shade val="63000"/>
+                <a:satMod val="120000"/>
+              </a:schemeClr>
+            </a:gs>
+          </a:gsLst>
+          <a:lin ang="5400000" scaled="0"/>
+        </a:gradFill>
+      </a:bgFillStyleLst>
+    </a:fmtScheme>
+  </a:themeElements>
+  <a:objectDefaults>
+    <a:lnDef>
+      <a:spPr/>
+      <a:bodyPr/>
+      <a:lstStyle/>
+      <a:style>
+        <a:lnRef idx="2">
+          <a:schemeClr val="accent1"/>
+        </a:lnRef>
+        <a:fillRef idx="0">
+          <a:schemeClr val="accent1"/>
+        </a:fillRef>
+        <a:effectRef idx="1">
+          <a:schemeClr val="accent1"/>
+        </a:effectRef>
+        <a:fontRef idx="minor">
+          <a:schemeClr val="tx1"/>
+        </a:fontRef>
+      </a:style>
+    </a:lnDef>
+  </a:objectDefaults>
+  <a:extraClrSchemeLst/>
+  <a:extLst>
+    <a:ext uri="{05A4C25C-085E-4340-85A3-A5531E510DB2}">
+      <thm15:themeFamily xmlns:thm15="http://schemas.microsoft.com/office/thememl/2012/main" name="Office Theme" id="{2E142A2C-CD16-42D6-873A-C26D2A0506FA}" vid="{1BDDFF52-6CD6-40A5-AB3C-68EB2F1E4D0A}"/>
+    </a:ext>
+  </a:extLst>
+</a:theme>
 </file>
</xml_diff>